<commit_message>
Versão 1 do guia do usuários
</commit_message>
<xml_diff>
--- a/Guia do Usuário.pptx
+++ b/Guia do Usuário.pptx
@@ -8,6 +8,7 @@
     <p:sldId id="256" r:id="rId2"/>
     <p:sldId id="257" r:id="rId3"/>
     <p:sldId id="258" r:id="rId4"/>
+    <p:sldId id="259" r:id="rId5"/>
   </p:sldIdLst>
   <p:sldSz cx="12192000" cy="6858000"/>
   <p:notesSz cx="6858000" cy="9144000"/>
@@ -106,6 +107,11 @@
       </a:defRPr>
     </a:lvl9pPr>
   </p:defaultTextStyle>
+  <p:extLst>
+    <p:ext uri="{EFAFB233-063F-42B5-8137-9DF3F51BA10A}">
+      <p15:sldGuideLst xmlns:p15="http://schemas.microsoft.com/office/powerpoint/2012/main"/>
+    </p:ext>
+  </p:extLst>
 </p:presentation>
 </file>
 
@@ -4891,6 +4897,36 @@
 </p:sld>
 </file>
 
+<file path=ppt/slides/slide4.xml><?xml version="1.0" encoding="utf-8"?>
+<p:sld xmlns:a="http://schemas.openxmlformats.org/drawingml/2006/main" xmlns:r="http://schemas.openxmlformats.org/officeDocument/2006/relationships" xmlns:p="http://schemas.openxmlformats.org/presentationml/2006/main">
+  <p:cSld>
+    <p:spTree>
+      <p:nvGrpSpPr>
+        <p:cNvPr id="1" name=""/>
+        <p:cNvGrpSpPr/>
+        <p:nvPr/>
+      </p:nvGrpSpPr>
+      <p:grpSpPr>
+        <a:xfrm>
+          <a:off x="0" y="0"/>
+          <a:ext cx="0" cy="0"/>
+          <a:chOff x="0" y="0"/>
+          <a:chExt cx="0" cy="0"/>
+        </a:xfrm>
+      </p:grpSpPr>
+    </p:spTree>
+    <p:extLst>
+      <p:ext uri="{BB962C8B-B14F-4D97-AF65-F5344CB8AC3E}">
+        <p14:creationId xmlns:p14="http://schemas.microsoft.com/office/powerpoint/2010/main" val="168796887"/>
+      </p:ext>
+    </p:extLst>
+  </p:cSld>
+  <p:clrMapOvr>
+    <a:masterClrMapping/>
+  </p:clrMapOvr>
+</p:sld>
+</file>
+
 <file path=ppt/theme/theme1.xml><?xml version="1.0" encoding="utf-8"?>
 <a:theme xmlns:a="http://schemas.openxmlformats.org/drawingml/2006/main" name="Tema do Office">
   <a:themeElements>

</xml_diff>